<commit_message>
change the presentation ppt
</commit_message>
<xml_diff>
--- a/presentation/3rd_presentation/GreenAI_3rd.pptx
+++ b/presentation/3rd_presentation/GreenAI_3rd.pptx
@@ -13,9 +13,9 @@
   </p:handoutMasterIdLst>
   <p:sldIdLst>
     <p:sldId id="256" r:id="rId3"/>
-    <p:sldId id="319" r:id="rId4"/>
+    <p:sldId id="381" r:id="rId4"/>
     <p:sldId id="317" r:id="rId5"/>
-    <p:sldId id="371" r:id="rId6"/>
+    <p:sldId id="380" r:id="rId6"/>
     <p:sldId id="353" r:id="rId7"/>
     <p:sldId id="372" r:id="rId8"/>
     <p:sldId id="374" r:id="rId9"/>
@@ -7712,8 +7712,28 @@
         <a:p>
           <a:pPr rtl="0"/>
           <a:r>
-            <a:rPr lang="en-US" sz="2400" dirty="0"/>
-            <a:t>Simulation results</a:t>
+            <a:rPr lang="en-US" sz="2400" b="0" dirty="0">
+              <a:solidFill>
+                <a:schemeClr val="bg1"/>
+              </a:solidFill>
+            </a:rPr>
+            <a:t>Simulation</a:t>
+          </a:r>
+          <a:r>
+            <a:rPr lang="en-US" sz="2400" b="1" dirty="0">
+              <a:solidFill>
+                <a:schemeClr val="tx1"/>
+              </a:solidFill>
+            </a:rPr>
+            <a:t> </a:t>
+          </a:r>
+          <a:r>
+            <a:rPr lang="en-US" sz="2400" b="1" dirty="0">
+              <a:solidFill>
+                <a:schemeClr val="bg1"/>
+              </a:solidFill>
+            </a:rPr>
+            <a:t>results</a:t>
           </a:r>
         </a:p>
       </dgm:t>
@@ -7740,6 +7760,51 @@
         </a:p>
       </dgm:t>
     </dgm:pt>
+    <dgm:pt modelId="{C57865FB-E721-7945-B102-3DC33349270D}">
+      <dgm:prSet custT="1"/>
+      <dgm:spPr/>
+      <dgm:t>
+        <a:bodyPr/>
+        <a:lstStyle/>
+        <a:p>
+          <a:r>
+            <a:rPr lang="en-US" altLang="zh-CN" sz="2400" b="0" dirty="0">
+              <a:solidFill>
+                <a:schemeClr val="bg1"/>
+              </a:solidFill>
+            </a:rPr>
+            <a:t>Next step</a:t>
+          </a:r>
+          <a:endParaRPr lang="zh-CN" altLang="en-US" sz="2400" b="0" dirty="0">
+            <a:solidFill>
+              <a:schemeClr val="bg1"/>
+            </a:solidFill>
+          </a:endParaRPr>
+        </a:p>
+      </dgm:t>
+    </dgm:pt>
+    <dgm:pt modelId="{9A35DC86-DC17-154F-B1AF-0AC1F2759487}" type="parTrans" cxnId="{037024FE-D194-2B4E-A276-D8CC4660EBA8}">
+      <dgm:prSet/>
+      <dgm:spPr/>
+      <dgm:t>
+        <a:bodyPr/>
+        <a:lstStyle/>
+        <a:p>
+          <a:endParaRPr lang="zh-CN" altLang="en-US"/>
+        </a:p>
+      </dgm:t>
+    </dgm:pt>
+    <dgm:pt modelId="{C576F9F8-F2BD-FF42-8A4C-B1C10B4A8948}" type="sibTrans" cxnId="{037024FE-D194-2B4E-A276-D8CC4660EBA8}">
+      <dgm:prSet/>
+      <dgm:spPr/>
+      <dgm:t>
+        <a:bodyPr/>
+        <a:lstStyle/>
+        <a:p>
+          <a:endParaRPr lang="zh-CN" altLang="en-US"/>
+        </a:p>
+      </dgm:t>
+    </dgm:pt>
     <dgm:pt modelId="{95FEDCAD-8145-3649-B402-FC9EF335529F}" type="pres">
       <dgm:prSet presAssocID="{07C71F93-A4DB-4FC6-87BB-FBF82839AB91}" presName="linear" presStyleCnt="0">
         <dgm:presLayoutVars>
@@ -7755,11 +7820,11 @@
       <dgm:spPr/>
     </dgm:pt>
     <dgm:pt modelId="{78FB6F6A-1397-F140-B94C-47B74E40DA7D}" type="pres">
-      <dgm:prSet presAssocID="{D0F52225-D323-4805-89C5-374A5AABBCCB}" presName="parentLeftMargin" presStyleLbl="node1" presStyleIdx="0" presStyleCnt="2"/>
+      <dgm:prSet presAssocID="{D0F52225-D323-4805-89C5-374A5AABBCCB}" presName="parentLeftMargin" presStyleLbl="node1" presStyleIdx="0" presStyleCnt="3"/>
       <dgm:spPr/>
     </dgm:pt>
     <dgm:pt modelId="{4DE260E5-B794-E44D-9A9E-F4D646D8E5A7}" type="pres">
-      <dgm:prSet presAssocID="{D0F52225-D323-4805-89C5-374A5AABBCCB}" presName="parentText" presStyleLbl="node1" presStyleIdx="0" presStyleCnt="2" custScaleX="109373">
+      <dgm:prSet presAssocID="{D0F52225-D323-4805-89C5-374A5AABBCCB}" presName="parentText" presStyleLbl="node1" presStyleIdx="0" presStyleCnt="3" custScaleX="109373">
         <dgm:presLayoutVars>
           <dgm:chMax val="0"/>
           <dgm:bulletEnabled val="1"/>
@@ -7772,7 +7837,7 @@
       <dgm:spPr/>
     </dgm:pt>
     <dgm:pt modelId="{AE644DA1-FB96-AD46-9351-A63F15BA70E1}" type="pres">
-      <dgm:prSet presAssocID="{D0F52225-D323-4805-89C5-374A5AABBCCB}" presName="childText" presStyleLbl="conFgAcc1" presStyleIdx="0" presStyleCnt="2">
+      <dgm:prSet presAssocID="{D0F52225-D323-4805-89C5-374A5AABBCCB}" presName="childText" presStyleLbl="conFgAcc1" presStyleIdx="0" presStyleCnt="3">
         <dgm:presLayoutVars>
           <dgm:bulletEnabled val="1"/>
         </dgm:presLayoutVars>
@@ -7788,11 +7853,11 @@
       <dgm:spPr/>
     </dgm:pt>
     <dgm:pt modelId="{8E7DFE44-18B9-5542-A26A-529A2B7CC0D4}" type="pres">
-      <dgm:prSet presAssocID="{8093CCB2-55DC-4C87-97D5-8D34688771A4}" presName="parentLeftMargin" presStyleLbl="node1" presStyleIdx="0" presStyleCnt="2"/>
+      <dgm:prSet presAssocID="{8093CCB2-55DC-4C87-97D5-8D34688771A4}" presName="parentLeftMargin" presStyleLbl="node1" presStyleIdx="0" presStyleCnt="3"/>
       <dgm:spPr/>
     </dgm:pt>
     <dgm:pt modelId="{B6A18748-4148-D347-BCCA-B76C98FAD828}" type="pres">
-      <dgm:prSet presAssocID="{8093CCB2-55DC-4C87-97D5-8D34688771A4}" presName="parentText" presStyleLbl="node1" presStyleIdx="1" presStyleCnt="2" custScaleX="110055" custLinFactNeighborX="-3647" custLinFactNeighborY="1574">
+      <dgm:prSet presAssocID="{8093CCB2-55DC-4C87-97D5-8D34688771A4}" presName="parentText" presStyleLbl="node1" presStyleIdx="1" presStyleCnt="3" custScaleX="110055" custLinFactNeighborX="-3647" custLinFactNeighborY="1574">
         <dgm:presLayoutVars>
           <dgm:chMax val="0"/>
           <dgm:bulletEnabled val="1"/>
@@ -7805,7 +7870,40 @@
       <dgm:spPr/>
     </dgm:pt>
     <dgm:pt modelId="{5CB3B87C-1EFC-DB45-96D0-47D3B8976425}" type="pres">
-      <dgm:prSet presAssocID="{8093CCB2-55DC-4C87-97D5-8D34688771A4}" presName="childText" presStyleLbl="conFgAcc1" presStyleIdx="1" presStyleCnt="2">
+      <dgm:prSet presAssocID="{8093CCB2-55DC-4C87-97D5-8D34688771A4}" presName="childText" presStyleLbl="conFgAcc1" presStyleIdx="1" presStyleCnt="3">
+        <dgm:presLayoutVars>
+          <dgm:bulletEnabled val="1"/>
+        </dgm:presLayoutVars>
+      </dgm:prSet>
+      <dgm:spPr/>
+    </dgm:pt>
+    <dgm:pt modelId="{415E2F08-92B7-214A-8A08-7681F11E3C3C}" type="pres">
+      <dgm:prSet presAssocID="{F21521B6-AC66-4DDA-9A93-EEAD2430B253}" presName="spaceBetweenRectangles" presStyleCnt="0"/>
+      <dgm:spPr/>
+    </dgm:pt>
+    <dgm:pt modelId="{E5EBF621-431F-2040-9E07-972112987871}" type="pres">
+      <dgm:prSet presAssocID="{C57865FB-E721-7945-B102-3DC33349270D}" presName="parentLin" presStyleCnt="0"/>
+      <dgm:spPr/>
+    </dgm:pt>
+    <dgm:pt modelId="{65084150-2F68-C141-8C2B-24AF60D18C12}" type="pres">
+      <dgm:prSet presAssocID="{C57865FB-E721-7945-B102-3DC33349270D}" presName="parentLeftMargin" presStyleLbl="node1" presStyleIdx="1" presStyleCnt="3"/>
+      <dgm:spPr/>
+    </dgm:pt>
+    <dgm:pt modelId="{78AE5B93-8DEE-704B-86F8-D2CF2AA0493D}" type="pres">
+      <dgm:prSet presAssocID="{C57865FB-E721-7945-B102-3DC33349270D}" presName="parentText" presStyleLbl="node1" presStyleIdx="2" presStyleCnt="3">
+        <dgm:presLayoutVars>
+          <dgm:chMax val="0"/>
+          <dgm:bulletEnabled val="1"/>
+        </dgm:presLayoutVars>
+      </dgm:prSet>
+      <dgm:spPr/>
+    </dgm:pt>
+    <dgm:pt modelId="{B6686C0D-63B6-1C4D-8CBC-1E8ED6E354C9}" type="pres">
+      <dgm:prSet presAssocID="{C57865FB-E721-7945-B102-3DC33349270D}" presName="negativeSpace" presStyleCnt="0"/>
+      <dgm:spPr/>
+    </dgm:pt>
+    <dgm:pt modelId="{5A72D70B-95A3-FE4A-9803-85FD746B2080}" type="pres">
+      <dgm:prSet presAssocID="{C57865FB-E721-7945-B102-3DC33349270D}" presName="childText" presStyleLbl="conFgAcc1" presStyleIdx="2" presStyleCnt="3">
         <dgm:presLayoutVars>
           <dgm:bulletEnabled val="1"/>
         </dgm:presLayoutVars>
@@ -7814,13 +7912,16 @@
     </dgm:pt>
   </dgm:ptLst>
   <dgm:cxnLst>
+    <dgm:cxn modelId="{7DBF5911-B5DB-2746-B406-0CD9014D7775}" type="presOf" srcId="{C57865FB-E721-7945-B102-3DC33349270D}" destId="{65084150-2F68-C141-8C2B-24AF60D18C12}" srcOrd="0" destOrd="0" presId="urn:microsoft.com/office/officeart/2005/8/layout/list1"/>
     <dgm:cxn modelId="{335BE521-C3FC-436B-8105-3AD92E6AA8DC}" srcId="{07C71F93-A4DB-4FC6-87BB-FBF82839AB91}" destId="{8093CCB2-55DC-4C87-97D5-8D34688771A4}" srcOrd="1" destOrd="0" parTransId="{8A6B0E2F-8DF3-4543-B81B-E86324849590}" sibTransId="{F21521B6-AC66-4DDA-9A93-EEAD2430B253}"/>
     <dgm:cxn modelId="{C4EA6548-550B-404E-B8F8-8ECFC72D157B}" type="presOf" srcId="{D0F52225-D323-4805-89C5-374A5AABBCCB}" destId="{4DE260E5-B794-E44D-9A9E-F4D646D8E5A7}" srcOrd="1" destOrd="0" presId="urn:microsoft.com/office/officeart/2005/8/layout/list1"/>
     <dgm:cxn modelId="{C341B261-E329-4A12-A018-15B679D0BEF7}" srcId="{07C71F93-A4DB-4FC6-87BB-FBF82839AB91}" destId="{D0F52225-D323-4805-89C5-374A5AABBCCB}" srcOrd="0" destOrd="0" parTransId="{F351F9F4-8505-421F-8DBA-D7009F735DE3}" sibTransId="{5E4FD710-04CD-4CB1-AB1C-15ECC322A7E8}"/>
     <dgm:cxn modelId="{603E4066-7846-C547-9167-0CA66B2D6B56}" type="presOf" srcId="{8093CCB2-55DC-4C87-97D5-8D34688771A4}" destId="{B6A18748-4148-D347-BCCA-B76C98FAD828}" srcOrd="1" destOrd="0" presId="urn:microsoft.com/office/officeart/2005/8/layout/list1"/>
     <dgm:cxn modelId="{1DA52795-F090-E543-B89B-238FBBABFB29}" type="presOf" srcId="{8093CCB2-55DC-4C87-97D5-8D34688771A4}" destId="{8E7DFE44-18B9-5542-A26A-529A2B7CC0D4}" srcOrd="0" destOrd="0" presId="urn:microsoft.com/office/officeart/2005/8/layout/list1"/>
     <dgm:cxn modelId="{266CB7AC-0AE7-874F-97EE-515AF282CAE0}" type="presOf" srcId="{D0F52225-D323-4805-89C5-374A5AABBCCB}" destId="{78FB6F6A-1397-F140-B94C-47B74E40DA7D}" srcOrd="0" destOrd="0" presId="urn:microsoft.com/office/officeart/2005/8/layout/list1"/>
+    <dgm:cxn modelId="{AE1CDEE2-536C-0145-A908-7A019D126BAF}" type="presOf" srcId="{C57865FB-E721-7945-B102-3DC33349270D}" destId="{78AE5B93-8DEE-704B-86F8-D2CF2AA0493D}" srcOrd="1" destOrd="0" presId="urn:microsoft.com/office/officeart/2005/8/layout/list1"/>
     <dgm:cxn modelId="{E89F3BE7-EA2E-2F4C-8848-E34AD2845008}" type="presOf" srcId="{07C71F93-A4DB-4FC6-87BB-FBF82839AB91}" destId="{95FEDCAD-8145-3649-B402-FC9EF335529F}" srcOrd="0" destOrd="0" presId="urn:microsoft.com/office/officeart/2005/8/layout/list1"/>
+    <dgm:cxn modelId="{037024FE-D194-2B4E-A276-D8CC4660EBA8}" srcId="{07C71F93-A4DB-4FC6-87BB-FBF82839AB91}" destId="{C57865FB-E721-7945-B102-3DC33349270D}" srcOrd="2" destOrd="0" parTransId="{9A35DC86-DC17-154F-B1AF-0AC1F2759487}" sibTransId="{C576F9F8-F2BD-FF42-8A4C-B1C10B4A8948}"/>
     <dgm:cxn modelId="{213A9FB2-32F1-5047-B81D-6574291F9429}" type="presParOf" srcId="{95FEDCAD-8145-3649-B402-FC9EF335529F}" destId="{66C11FC2-6F36-1543-98DC-419DEE827990}" srcOrd="0" destOrd="0" presId="urn:microsoft.com/office/officeart/2005/8/layout/list1"/>
     <dgm:cxn modelId="{650BFF32-41F4-BA44-9B0B-9F7096A6C19D}" type="presParOf" srcId="{66C11FC2-6F36-1543-98DC-419DEE827990}" destId="{78FB6F6A-1397-F140-B94C-47B74E40DA7D}" srcOrd="0" destOrd="0" presId="urn:microsoft.com/office/officeart/2005/8/layout/list1"/>
     <dgm:cxn modelId="{A5611508-08ED-084A-809F-C22589D62F57}" type="presParOf" srcId="{66C11FC2-6F36-1543-98DC-419DEE827990}" destId="{4DE260E5-B794-E44D-9A9E-F4D646D8E5A7}" srcOrd="1" destOrd="0" presId="urn:microsoft.com/office/officeart/2005/8/layout/list1"/>
@@ -7832,6 +7933,12 @@
     <dgm:cxn modelId="{6608A715-A98E-494B-AFF2-6983DCE5D3C2}" type="presParOf" srcId="{C1338FF5-565A-0A41-95FF-786B007F3862}" destId="{B6A18748-4148-D347-BCCA-B76C98FAD828}" srcOrd="1" destOrd="0" presId="urn:microsoft.com/office/officeart/2005/8/layout/list1"/>
     <dgm:cxn modelId="{E850745B-8A38-BF42-8BF7-952F991E1CE5}" type="presParOf" srcId="{95FEDCAD-8145-3649-B402-FC9EF335529F}" destId="{CB3AA200-91F3-EF4A-95EB-6F5836F2731C}" srcOrd="5" destOrd="0" presId="urn:microsoft.com/office/officeart/2005/8/layout/list1"/>
     <dgm:cxn modelId="{821C1AC0-5610-A54D-BC0B-BFA13111D7FF}" type="presParOf" srcId="{95FEDCAD-8145-3649-B402-FC9EF335529F}" destId="{5CB3B87C-1EFC-DB45-96D0-47D3B8976425}" srcOrd="6" destOrd="0" presId="urn:microsoft.com/office/officeart/2005/8/layout/list1"/>
+    <dgm:cxn modelId="{E2B85E6B-EAA8-EA4D-B554-4197A860A2BA}" type="presParOf" srcId="{95FEDCAD-8145-3649-B402-FC9EF335529F}" destId="{415E2F08-92B7-214A-8A08-7681F11E3C3C}" srcOrd="7" destOrd="0" presId="urn:microsoft.com/office/officeart/2005/8/layout/list1"/>
+    <dgm:cxn modelId="{695A3246-0C7E-5F43-A816-D544D5CA4EDF}" type="presParOf" srcId="{95FEDCAD-8145-3649-B402-FC9EF335529F}" destId="{E5EBF621-431F-2040-9E07-972112987871}" srcOrd="8" destOrd="0" presId="urn:microsoft.com/office/officeart/2005/8/layout/list1"/>
+    <dgm:cxn modelId="{7F445E3A-49A7-014A-97CF-5F36A5C49285}" type="presParOf" srcId="{E5EBF621-431F-2040-9E07-972112987871}" destId="{65084150-2F68-C141-8C2B-24AF60D18C12}" srcOrd="0" destOrd="0" presId="urn:microsoft.com/office/officeart/2005/8/layout/list1"/>
+    <dgm:cxn modelId="{FF95F732-05A5-C845-A33F-B6C918B78F8B}" type="presParOf" srcId="{E5EBF621-431F-2040-9E07-972112987871}" destId="{78AE5B93-8DEE-704B-86F8-D2CF2AA0493D}" srcOrd="1" destOrd="0" presId="urn:microsoft.com/office/officeart/2005/8/layout/list1"/>
+    <dgm:cxn modelId="{33819322-70A7-5941-B7CE-625FB3A56B6E}" type="presParOf" srcId="{95FEDCAD-8145-3649-B402-FC9EF335529F}" destId="{B6686C0D-63B6-1C4D-8CBC-1E8ED6E354C9}" srcOrd="9" destOrd="0" presId="urn:microsoft.com/office/officeart/2005/8/layout/list1"/>
+    <dgm:cxn modelId="{B2AEBA68-0DDC-2041-9C53-4F0CD8239C1D}" type="presParOf" srcId="{95FEDCAD-8145-3649-B402-FC9EF335529F}" destId="{5A72D70B-95A3-FE4A-9803-85FD746B2080}" srcOrd="10" destOrd="0" presId="urn:microsoft.com/office/officeart/2005/8/layout/list1"/>
   </dgm:cxnLst>
   <dgm:bg/>
   <dgm:whole/>
@@ -7871,7 +7978,7 @@
                 <a:schemeClr val="bg1"/>
               </a:solidFill>
             </a:rPr>
-            <a:t>Last time question </a:t>
+            <a:t>Last time</a:t>
           </a:r>
         </a:p>
       </dgm:t>
@@ -7939,6 +8046,51 @@
         </a:p>
       </dgm:t>
     </dgm:pt>
+    <dgm:pt modelId="{C57865FB-E721-7945-B102-3DC33349270D}">
+      <dgm:prSet custT="1"/>
+      <dgm:spPr/>
+      <dgm:t>
+        <a:bodyPr/>
+        <a:lstStyle/>
+        <a:p>
+          <a:r>
+            <a:rPr lang="en-US" altLang="zh-CN" sz="2400" b="0" dirty="0">
+              <a:solidFill>
+                <a:schemeClr val="bg1"/>
+              </a:solidFill>
+            </a:rPr>
+            <a:t>Next step</a:t>
+          </a:r>
+          <a:endParaRPr lang="zh-CN" altLang="en-US" sz="2400" b="0" dirty="0">
+            <a:solidFill>
+              <a:schemeClr val="bg1"/>
+            </a:solidFill>
+          </a:endParaRPr>
+        </a:p>
+      </dgm:t>
+    </dgm:pt>
+    <dgm:pt modelId="{9A35DC86-DC17-154F-B1AF-0AC1F2759487}" type="parTrans" cxnId="{037024FE-D194-2B4E-A276-D8CC4660EBA8}">
+      <dgm:prSet/>
+      <dgm:spPr/>
+      <dgm:t>
+        <a:bodyPr/>
+        <a:lstStyle/>
+        <a:p>
+          <a:endParaRPr lang="zh-CN" altLang="en-US"/>
+        </a:p>
+      </dgm:t>
+    </dgm:pt>
+    <dgm:pt modelId="{C576F9F8-F2BD-FF42-8A4C-B1C10B4A8948}" type="sibTrans" cxnId="{037024FE-D194-2B4E-A276-D8CC4660EBA8}">
+      <dgm:prSet/>
+      <dgm:spPr/>
+      <dgm:t>
+        <a:bodyPr/>
+        <a:lstStyle/>
+        <a:p>
+          <a:endParaRPr lang="zh-CN" altLang="en-US"/>
+        </a:p>
+      </dgm:t>
+    </dgm:pt>
     <dgm:pt modelId="{95FEDCAD-8145-3649-B402-FC9EF335529F}" type="pres">
       <dgm:prSet presAssocID="{07C71F93-A4DB-4FC6-87BB-FBF82839AB91}" presName="linear" presStyleCnt="0">
         <dgm:presLayoutVars>
@@ -7954,11 +8106,11 @@
       <dgm:spPr/>
     </dgm:pt>
     <dgm:pt modelId="{78FB6F6A-1397-F140-B94C-47B74E40DA7D}" type="pres">
-      <dgm:prSet presAssocID="{D0F52225-D323-4805-89C5-374A5AABBCCB}" presName="parentLeftMargin" presStyleLbl="node1" presStyleIdx="0" presStyleCnt="2"/>
+      <dgm:prSet presAssocID="{D0F52225-D323-4805-89C5-374A5AABBCCB}" presName="parentLeftMargin" presStyleLbl="node1" presStyleIdx="0" presStyleCnt="3"/>
       <dgm:spPr/>
     </dgm:pt>
     <dgm:pt modelId="{4DE260E5-B794-E44D-9A9E-F4D646D8E5A7}" type="pres">
-      <dgm:prSet presAssocID="{D0F52225-D323-4805-89C5-374A5AABBCCB}" presName="parentText" presStyleLbl="node1" presStyleIdx="0" presStyleCnt="2" custScaleX="109373">
+      <dgm:prSet presAssocID="{D0F52225-D323-4805-89C5-374A5AABBCCB}" presName="parentText" presStyleLbl="node1" presStyleIdx="0" presStyleCnt="3" custScaleX="109373">
         <dgm:presLayoutVars>
           <dgm:chMax val="0"/>
           <dgm:bulletEnabled val="1"/>
@@ -7971,7 +8123,7 @@
       <dgm:spPr/>
     </dgm:pt>
     <dgm:pt modelId="{AE644DA1-FB96-AD46-9351-A63F15BA70E1}" type="pres">
-      <dgm:prSet presAssocID="{D0F52225-D323-4805-89C5-374A5AABBCCB}" presName="childText" presStyleLbl="conFgAcc1" presStyleIdx="0" presStyleCnt="2">
+      <dgm:prSet presAssocID="{D0F52225-D323-4805-89C5-374A5AABBCCB}" presName="childText" presStyleLbl="conFgAcc1" presStyleIdx="0" presStyleCnt="3">
         <dgm:presLayoutVars>
           <dgm:bulletEnabled val="1"/>
         </dgm:presLayoutVars>
@@ -7987,11 +8139,11 @@
       <dgm:spPr/>
     </dgm:pt>
     <dgm:pt modelId="{8E7DFE44-18B9-5542-A26A-529A2B7CC0D4}" type="pres">
-      <dgm:prSet presAssocID="{8093CCB2-55DC-4C87-97D5-8D34688771A4}" presName="parentLeftMargin" presStyleLbl="node1" presStyleIdx="0" presStyleCnt="2"/>
+      <dgm:prSet presAssocID="{8093CCB2-55DC-4C87-97D5-8D34688771A4}" presName="parentLeftMargin" presStyleLbl="node1" presStyleIdx="0" presStyleCnt="3"/>
       <dgm:spPr/>
     </dgm:pt>
     <dgm:pt modelId="{B6A18748-4148-D347-BCCA-B76C98FAD828}" type="pres">
-      <dgm:prSet presAssocID="{8093CCB2-55DC-4C87-97D5-8D34688771A4}" presName="parentText" presStyleLbl="node1" presStyleIdx="1" presStyleCnt="2" custScaleX="110055" custLinFactNeighborX="-3647" custLinFactNeighborY="1574">
+      <dgm:prSet presAssocID="{8093CCB2-55DC-4C87-97D5-8D34688771A4}" presName="parentText" presStyleLbl="node1" presStyleIdx="1" presStyleCnt="3" custScaleX="110055" custLinFactNeighborX="-3647" custLinFactNeighborY="1574">
         <dgm:presLayoutVars>
           <dgm:chMax val="0"/>
           <dgm:bulletEnabled val="1"/>
@@ -8004,7 +8156,40 @@
       <dgm:spPr/>
     </dgm:pt>
     <dgm:pt modelId="{5CB3B87C-1EFC-DB45-96D0-47D3B8976425}" type="pres">
-      <dgm:prSet presAssocID="{8093CCB2-55DC-4C87-97D5-8D34688771A4}" presName="childText" presStyleLbl="conFgAcc1" presStyleIdx="1" presStyleCnt="2">
+      <dgm:prSet presAssocID="{8093CCB2-55DC-4C87-97D5-8D34688771A4}" presName="childText" presStyleLbl="conFgAcc1" presStyleIdx="1" presStyleCnt="3">
+        <dgm:presLayoutVars>
+          <dgm:bulletEnabled val="1"/>
+        </dgm:presLayoutVars>
+      </dgm:prSet>
+      <dgm:spPr/>
+    </dgm:pt>
+    <dgm:pt modelId="{415E2F08-92B7-214A-8A08-7681F11E3C3C}" type="pres">
+      <dgm:prSet presAssocID="{F21521B6-AC66-4DDA-9A93-EEAD2430B253}" presName="spaceBetweenRectangles" presStyleCnt="0"/>
+      <dgm:spPr/>
+    </dgm:pt>
+    <dgm:pt modelId="{E5EBF621-431F-2040-9E07-972112987871}" type="pres">
+      <dgm:prSet presAssocID="{C57865FB-E721-7945-B102-3DC33349270D}" presName="parentLin" presStyleCnt="0"/>
+      <dgm:spPr/>
+    </dgm:pt>
+    <dgm:pt modelId="{65084150-2F68-C141-8C2B-24AF60D18C12}" type="pres">
+      <dgm:prSet presAssocID="{C57865FB-E721-7945-B102-3DC33349270D}" presName="parentLeftMargin" presStyleLbl="node1" presStyleIdx="1" presStyleCnt="3"/>
+      <dgm:spPr/>
+    </dgm:pt>
+    <dgm:pt modelId="{78AE5B93-8DEE-704B-86F8-D2CF2AA0493D}" type="pres">
+      <dgm:prSet presAssocID="{C57865FB-E721-7945-B102-3DC33349270D}" presName="parentText" presStyleLbl="node1" presStyleIdx="2" presStyleCnt="3">
+        <dgm:presLayoutVars>
+          <dgm:chMax val="0"/>
+          <dgm:bulletEnabled val="1"/>
+        </dgm:presLayoutVars>
+      </dgm:prSet>
+      <dgm:spPr/>
+    </dgm:pt>
+    <dgm:pt modelId="{B6686C0D-63B6-1C4D-8CBC-1E8ED6E354C9}" type="pres">
+      <dgm:prSet presAssocID="{C57865FB-E721-7945-B102-3DC33349270D}" presName="negativeSpace" presStyleCnt="0"/>
+      <dgm:spPr/>
+    </dgm:pt>
+    <dgm:pt modelId="{5A72D70B-95A3-FE4A-9803-85FD746B2080}" type="pres">
+      <dgm:prSet presAssocID="{C57865FB-E721-7945-B102-3DC33349270D}" presName="childText" presStyleLbl="conFgAcc1" presStyleIdx="2" presStyleCnt="3">
         <dgm:presLayoutVars>
           <dgm:bulletEnabled val="1"/>
         </dgm:presLayoutVars>
@@ -8013,13 +8198,16 @@
     </dgm:pt>
   </dgm:ptLst>
   <dgm:cxnLst>
+    <dgm:cxn modelId="{7DBF5911-B5DB-2746-B406-0CD9014D7775}" type="presOf" srcId="{C57865FB-E721-7945-B102-3DC33349270D}" destId="{65084150-2F68-C141-8C2B-24AF60D18C12}" srcOrd="0" destOrd="0" presId="urn:microsoft.com/office/officeart/2005/8/layout/list1"/>
     <dgm:cxn modelId="{335BE521-C3FC-436B-8105-3AD92E6AA8DC}" srcId="{07C71F93-A4DB-4FC6-87BB-FBF82839AB91}" destId="{8093CCB2-55DC-4C87-97D5-8D34688771A4}" srcOrd="1" destOrd="0" parTransId="{8A6B0E2F-8DF3-4543-B81B-E86324849590}" sibTransId="{F21521B6-AC66-4DDA-9A93-EEAD2430B253}"/>
     <dgm:cxn modelId="{C4EA6548-550B-404E-B8F8-8ECFC72D157B}" type="presOf" srcId="{D0F52225-D323-4805-89C5-374A5AABBCCB}" destId="{4DE260E5-B794-E44D-9A9E-F4D646D8E5A7}" srcOrd="1" destOrd="0" presId="urn:microsoft.com/office/officeart/2005/8/layout/list1"/>
     <dgm:cxn modelId="{C341B261-E329-4A12-A018-15B679D0BEF7}" srcId="{07C71F93-A4DB-4FC6-87BB-FBF82839AB91}" destId="{D0F52225-D323-4805-89C5-374A5AABBCCB}" srcOrd="0" destOrd="0" parTransId="{F351F9F4-8505-421F-8DBA-D7009F735DE3}" sibTransId="{5E4FD710-04CD-4CB1-AB1C-15ECC322A7E8}"/>
     <dgm:cxn modelId="{603E4066-7846-C547-9167-0CA66B2D6B56}" type="presOf" srcId="{8093CCB2-55DC-4C87-97D5-8D34688771A4}" destId="{B6A18748-4148-D347-BCCA-B76C98FAD828}" srcOrd="1" destOrd="0" presId="urn:microsoft.com/office/officeart/2005/8/layout/list1"/>
     <dgm:cxn modelId="{1DA52795-F090-E543-B89B-238FBBABFB29}" type="presOf" srcId="{8093CCB2-55DC-4C87-97D5-8D34688771A4}" destId="{8E7DFE44-18B9-5542-A26A-529A2B7CC0D4}" srcOrd="0" destOrd="0" presId="urn:microsoft.com/office/officeart/2005/8/layout/list1"/>
     <dgm:cxn modelId="{266CB7AC-0AE7-874F-97EE-515AF282CAE0}" type="presOf" srcId="{D0F52225-D323-4805-89C5-374A5AABBCCB}" destId="{78FB6F6A-1397-F140-B94C-47B74E40DA7D}" srcOrd="0" destOrd="0" presId="urn:microsoft.com/office/officeart/2005/8/layout/list1"/>
+    <dgm:cxn modelId="{AE1CDEE2-536C-0145-A908-7A019D126BAF}" type="presOf" srcId="{C57865FB-E721-7945-B102-3DC33349270D}" destId="{78AE5B93-8DEE-704B-86F8-D2CF2AA0493D}" srcOrd="1" destOrd="0" presId="urn:microsoft.com/office/officeart/2005/8/layout/list1"/>
     <dgm:cxn modelId="{E89F3BE7-EA2E-2F4C-8848-E34AD2845008}" type="presOf" srcId="{07C71F93-A4DB-4FC6-87BB-FBF82839AB91}" destId="{95FEDCAD-8145-3649-B402-FC9EF335529F}" srcOrd="0" destOrd="0" presId="urn:microsoft.com/office/officeart/2005/8/layout/list1"/>
+    <dgm:cxn modelId="{037024FE-D194-2B4E-A276-D8CC4660EBA8}" srcId="{07C71F93-A4DB-4FC6-87BB-FBF82839AB91}" destId="{C57865FB-E721-7945-B102-3DC33349270D}" srcOrd="2" destOrd="0" parTransId="{9A35DC86-DC17-154F-B1AF-0AC1F2759487}" sibTransId="{C576F9F8-F2BD-FF42-8A4C-B1C10B4A8948}"/>
     <dgm:cxn modelId="{213A9FB2-32F1-5047-B81D-6574291F9429}" type="presParOf" srcId="{95FEDCAD-8145-3649-B402-FC9EF335529F}" destId="{66C11FC2-6F36-1543-98DC-419DEE827990}" srcOrd="0" destOrd="0" presId="urn:microsoft.com/office/officeart/2005/8/layout/list1"/>
     <dgm:cxn modelId="{650BFF32-41F4-BA44-9B0B-9F7096A6C19D}" type="presParOf" srcId="{66C11FC2-6F36-1543-98DC-419DEE827990}" destId="{78FB6F6A-1397-F140-B94C-47B74E40DA7D}" srcOrd="0" destOrd="0" presId="urn:microsoft.com/office/officeart/2005/8/layout/list1"/>
     <dgm:cxn modelId="{A5611508-08ED-084A-809F-C22589D62F57}" type="presParOf" srcId="{66C11FC2-6F36-1543-98DC-419DEE827990}" destId="{4DE260E5-B794-E44D-9A9E-F4D646D8E5A7}" srcOrd="1" destOrd="0" presId="urn:microsoft.com/office/officeart/2005/8/layout/list1"/>
@@ -8031,6 +8219,12 @@
     <dgm:cxn modelId="{6608A715-A98E-494B-AFF2-6983DCE5D3C2}" type="presParOf" srcId="{C1338FF5-565A-0A41-95FF-786B007F3862}" destId="{B6A18748-4148-D347-BCCA-B76C98FAD828}" srcOrd="1" destOrd="0" presId="urn:microsoft.com/office/officeart/2005/8/layout/list1"/>
     <dgm:cxn modelId="{E850745B-8A38-BF42-8BF7-952F991E1CE5}" type="presParOf" srcId="{95FEDCAD-8145-3649-B402-FC9EF335529F}" destId="{CB3AA200-91F3-EF4A-95EB-6F5836F2731C}" srcOrd="5" destOrd="0" presId="urn:microsoft.com/office/officeart/2005/8/layout/list1"/>
     <dgm:cxn modelId="{821C1AC0-5610-A54D-BC0B-BFA13111D7FF}" type="presParOf" srcId="{95FEDCAD-8145-3649-B402-FC9EF335529F}" destId="{5CB3B87C-1EFC-DB45-96D0-47D3B8976425}" srcOrd="6" destOrd="0" presId="urn:microsoft.com/office/officeart/2005/8/layout/list1"/>
+    <dgm:cxn modelId="{E2B85E6B-EAA8-EA4D-B554-4197A860A2BA}" type="presParOf" srcId="{95FEDCAD-8145-3649-B402-FC9EF335529F}" destId="{415E2F08-92B7-214A-8A08-7681F11E3C3C}" srcOrd="7" destOrd="0" presId="urn:microsoft.com/office/officeart/2005/8/layout/list1"/>
+    <dgm:cxn modelId="{695A3246-0C7E-5F43-A816-D544D5CA4EDF}" type="presParOf" srcId="{95FEDCAD-8145-3649-B402-FC9EF335529F}" destId="{E5EBF621-431F-2040-9E07-972112987871}" srcOrd="8" destOrd="0" presId="urn:microsoft.com/office/officeart/2005/8/layout/list1"/>
+    <dgm:cxn modelId="{7F445E3A-49A7-014A-97CF-5F36A5C49285}" type="presParOf" srcId="{E5EBF621-431F-2040-9E07-972112987871}" destId="{65084150-2F68-C141-8C2B-24AF60D18C12}" srcOrd="0" destOrd="0" presId="urn:microsoft.com/office/officeart/2005/8/layout/list1"/>
+    <dgm:cxn modelId="{FF95F732-05A5-C845-A33F-B6C918B78F8B}" type="presParOf" srcId="{E5EBF621-431F-2040-9E07-972112987871}" destId="{78AE5B93-8DEE-704B-86F8-D2CF2AA0493D}" srcOrd="1" destOrd="0" presId="urn:microsoft.com/office/officeart/2005/8/layout/list1"/>
+    <dgm:cxn modelId="{33819322-70A7-5941-B7CE-625FB3A56B6E}" type="presParOf" srcId="{95FEDCAD-8145-3649-B402-FC9EF335529F}" destId="{B6686C0D-63B6-1C4D-8CBC-1E8ED6E354C9}" srcOrd="9" destOrd="0" presId="urn:microsoft.com/office/officeart/2005/8/layout/list1"/>
+    <dgm:cxn modelId="{B2AEBA68-0DDC-2041-9C53-4F0CD8239C1D}" type="presParOf" srcId="{95FEDCAD-8145-3649-B402-FC9EF335529F}" destId="{5A72D70B-95A3-FE4A-9803-85FD746B2080}" srcOrd="10" destOrd="0" presId="urn:microsoft.com/office/officeart/2005/8/layout/list1"/>
   </dgm:cxnLst>
   <dgm:bg/>
   <dgm:whole/>
@@ -8065,18 +8259,13 @@
         <a:p>
           <a:pPr rtl="0"/>
           <a:r>
-            <a:rPr lang="en-US" sz="2400" b="0">
+            <a:rPr lang="en-US" sz="2400" b="0" dirty="0">
               <a:solidFill>
                 <a:schemeClr val="bg1"/>
               </a:solidFill>
             </a:rPr>
             <a:t>Last time</a:t>
           </a:r>
-          <a:endParaRPr lang="en-US" sz="2400" b="0" dirty="0">
-            <a:solidFill>
-              <a:schemeClr val="bg1"/>
-            </a:solidFill>
-          </a:endParaRPr>
         </a:p>
       </dgm:t>
     </dgm:pt>
@@ -8348,8 +8537,8 @@
       </dsp:nvSpPr>
       <dsp:spPr>
         <a:xfrm>
-          <a:off x="0" y="752769"/>
-          <a:ext cx="10515600" cy="1285199"/>
+          <a:off x="0" y="506529"/>
+          <a:ext cx="10515600" cy="831599"/>
         </a:xfrm>
         <a:prstGeom prst="rect">
           <a:avLst/>
@@ -8397,8 +8586,8 @@
       </dsp:nvSpPr>
       <dsp:spPr>
         <a:xfrm>
-          <a:off x="525780" y="9"/>
-          <a:ext cx="8050859" cy="1505520"/>
+          <a:off x="525780" y="19449"/>
+          <a:ext cx="8050859" cy="974160"/>
         </a:xfrm>
         <a:prstGeom prst="roundRect">
           <a:avLst/>
@@ -8468,8 +8657,8 @@
         </a:p>
       </dsp:txBody>
       <dsp:txXfrm>
-        <a:off x="599273" y="73502"/>
-        <a:ext cx="7903873" cy="1358534"/>
+        <a:off x="573335" y="67004"/>
+        <a:ext cx="7955749" cy="879050"/>
       </dsp:txXfrm>
     </dsp:sp>
     <dsp:sp modelId="{5CB3B87C-1EFC-DB45-96D0-47D3B8976425}">
@@ -8479,8 +8668,8 @@
       </dsp:nvSpPr>
       <dsp:spPr>
         <a:xfrm>
-          <a:off x="0" y="3066129"/>
-          <a:ext cx="10515600" cy="1285199"/>
+          <a:off x="0" y="2003409"/>
+          <a:ext cx="10515600" cy="831599"/>
         </a:xfrm>
         <a:prstGeom prst="rect">
           <a:avLst/>
@@ -8528,147 +8717,8 @@
       </dsp:nvSpPr>
       <dsp:spPr>
         <a:xfrm>
-          <a:off x="506604" y="2337065"/>
-          <a:ext cx="8101060" cy="1505520"/>
-        </a:xfrm>
-        <a:prstGeom prst="roundRect">
-          <a:avLst/>
-        </a:prstGeom>
-        <a:solidFill>
-          <a:schemeClr val="accent1">
-            <a:hueOff val="0"/>
-            <a:satOff val="0"/>
-            <a:lumOff val="0"/>
-            <a:alphaOff val="0"/>
-          </a:schemeClr>
-        </a:solidFill>
-        <a:ln w="12700" cap="flat" cmpd="sng" algn="ctr">
-          <a:solidFill>
-            <a:schemeClr val="lt1">
-              <a:hueOff val="0"/>
-              <a:satOff val="0"/>
-              <a:lumOff val="0"/>
-              <a:alphaOff val="0"/>
-            </a:schemeClr>
-          </a:solidFill>
-          <a:prstDash val="solid"/>
-          <a:miter lim="800000"/>
-        </a:ln>
-        <a:effectLst/>
-      </dsp:spPr>
-      <dsp:style>
-        <a:lnRef idx="2">
-          <a:scrgbClr r="0" g="0" b="0"/>
-        </a:lnRef>
-        <a:fillRef idx="1">
-          <a:scrgbClr r="0" g="0" b="0"/>
-        </a:fillRef>
-        <a:effectRef idx="0">
-          <a:scrgbClr r="0" g="0" b="0"/>
-        </a:effectRef>
-        <a:fontRef idx="minor">
-          <a:schemeClr val="lt1"/>
-        </a:fontRef>
-      </dsp:style>
-      <dsp:txBody>
-        <a:bodyPr spcFirstLastPara="0" vert="horz" wrap="square" lIns="278225" tIns="0" rIns="278225" bIns="0" numCol="1" spcCol="1270" anchor="ctr" anchorCtr="0">
-          <a:noAutofit/>
-        </a:bodyPr>
-        <a:lstStyle/>
-        <a:p>
-          <a:pPr marL="0" lvl="0" indent="0" algn="l" defTabSz="1066800" rtl="0">
-            <a:lnSpc>
-              <a:spcPct val="90000"/>
-            </a:lnSpc>
-            <a:spcBef>
-              <a:spcPct val="0"/>
-            </a:spcBef>
-            <a:spcAft>
-              <a:spcPct val="35000"/>
-            </a:spcAft>
-            <a:buNone/>
-          </a:pPr>
-          <a:r>
-            <a:rPr lang="en-US" sz="2400" kern="1200" dirty="0"/>
-            <a:t>Simulation results</a:t>
-          </a:r>
-        </a:p>
-      </dsp:txBody>
-      <dsp:txXfrm>
-        <a:off x="580097" y="2410558"/>
-        <a:ext cx="7954074" cy="1358534"/>
-      </dsp:txXfrm>
-    </dsp:sp>
-  </dsp:spTree>
-</dsp:drawing>
-</file>
-
-<file path=ppt/diagrams/drawing2.xml><?xml version="1.0" encoding="utf-8"?>
-<dsp:drawing xmlns:dgm="http://schemas.openxmlformats.org/drawingml/2006/diagram" xmlns:dsp="http://schemas.microsoft.com/office/drawing/2008/diagram" xmlns:a="http://schemas.openxmlformats.org/drawingml/2006/main">
-  <dsp:spTree>
-    <dsp:nvGrpSpPr>
-      <dsp:cNvPr id="0" name=""/>
-      <dsp:cNvGrpSpPr/>
-    </dsp:nvGrpSpPr>
-    <dsp:grpSpPr/>
-    <dsp:sp modelId="{AE644DA1-FB96-AD46-9351-A63F15BA70E1}">
-      <dsp:nvSpPr>
-        <dsp:cNvPr id="0" name=""/>
-        <dsp:cNvSpPr/>
-      </dsp:nvSpPr>
-      <dsp:spPr>
-        <a:xfrm>
-          <a:off x="0" y="752769"/>
-          <a:ext cx="10515600" cy="1285199"/>
-        </a:xfrm>
-        <a:prstGeom prst="rect">
-          <a:avLst/>
-        </a:prstGeom>
-        <a:solidFill>
-          <a:schemeClr val="lt1">
-            <a:alpha val="90000"/>
-            <a:hueOff val="0"/>
-            <a:satOff val="0"/>
-            <a:lumOff val="0"/>
-            <a:alphaOff val="0"/>
-          </a:schemeClr>
-        </a:solidFill>
-        <a:ln w="12700" cap="flat" cmpd="sng" algn="ctr">
-          <a:solidFill>
-            <a:schemeClr val="accent1">
-              <a:hueOff val="0"/>
-              <a:satOff val="0"/>
-              <a:lumOff val="0"/>
-              <a:alphaOff val="0"/>
-            </a:schemeClr>
-          </a:solidFill>
-          <a:prstDash val="solid"/>
-          <a:miter lim="800000"/>
-        </a:ln>
-        <a:effectLst/>
-      </dsp:spPr>
-      <dsp:style>
-        <a:lnRef idx="2">
-          <a:scrgbClr r="0" g="0" b="0"/>
-        </a:lnRef>
-        <a:fillRef idx="1">
-          <a:scrgbClr r="0" g="0" b="0"/>
-        </a:fillRef>
-        <a:effectRef idx="0">
-          <a:scrgbClr r="0" g="0" b="0"/>
-        </a:effectRef>
-        <a:fontRef idx="minor"/>
-      </dsp:style>
-    </dsp:sp>
-    <dsp:sp modelId="{4DE260E5-B794-E44D-9A9E-F4D646D8E5A7}">
-      <dsp:nvSpPr>
-        <dsp:cNvPr id="0" name=""/>
-        <dsp:cNvSpPr/>
-      </dsp:nvSpPr>
-      <dsp:spPr>
-        <a:xfrm>
-          <a:off x="525780" y="9"/>
-          <a:ext cx="8050859" cy="1505520"/>
+          <a:off x="506604" y="1531662"/>
+          <a:ext cx="8101060" cy="974160"/>
         </a:xfrm>
         <a:prstGeom prst="roundRect">
           <a:avLst/>
@@ -8733,13 +8783,308 @@
                 <a:schemeClr val="bg1"/>
               </a:solidFill>
             </a:rPr>
-            <a:t>Last time question </a:t>
+            <a:t>Simulation</a:t>
+          </a:r>
+          <a:r>
+            <a:rPr lang="en-US" sz="2400" b="1" kern="1200" dirty="0">
+              <a:solidFill>
+                <a:schemeClr val="tx1"/>
+              </a:solidFill>
+            </a:rPr>
+            <a:t> </a:t>
+          </a:r>
+          <a:r>
+            <a:rPr lang="en-US" sz="2400" b="1" kern="1200" dirty="0">
+              <a:solidFill>
+                <a:schemeClr val="bg1"/>
+              </a:solidFill>
+            </a:rPr>
+            <a:t>results</a:t>
           </a:r>
         </a:p>
       </dsp:txBody>
       <dsp:txXfrm>
-        <a:off x="599273" y="73502"/>
-        <a:ext cx="7903873" cy="1358534"/>
+        <a:off x="554159" y="1579217"/>
+        <a:ext cx="8005950" cy="879050"/>
+      </dsp:txXfrm>
+    </dsp:sp>
+    <dsp:sp modelId="{5A72D70B-95A3-FE4A-9803-85FD746B2080}">
+      <dsp:nvSpPr>
+        <dsp:cNvPr id="0" name=""/>
+        <dsp:cNvSpPr/>
+      </dsp:nvSpPr>
+      <dsp:spPr>
+        <a:xfrm>
+          <a:off x="0" y="3500289"/>
+          <a:ext cx="10515600" cy="831599"/>
+        </a:xfrm>
+        <a:prstGeom prst="rect">
+          <a:avLst/>
+        </a:prstGeom>
+        <a:solidFill>
+          <a:schemeClr val="lt1">
+            <a:alpha val="90000"/>
+            <a:hueOff val="0"/>
+            <a:satOff val="0"/>
+            <a:lumOff val="0"/>
+            <a:alphaOff val="0"/>
+          </a:schemeClr>
+        </a:solidFill>
+        <a:ln w="12700" cap="flat" cmpd="sng" algn="ctr">
+          <a:solidFill>
+            <a:schemeClr val="accent1">
+              <a:hueOff val="0"/>
+              <a:satOff val="0"/>
+              <a:lumOff val="0"/>
+              <a:alphaOff val="0"/>
+            </a:schemeClr>
+          </a:solidFill>
+          <a:prstDash val="solid"/>
+          <a:miter lim="800000"/>
+        </a:ln>
+        <a:effectLst/>
+      </dsp:spPr>
+      <dsp:style>
+        <a:lnRef idx="2">
+          <a:scrgbClr r="0" g="0" b="0"/>
+        </a:lnRef>
+        <a:fillRef idx="1">
+          <a:scrgbClr r="0" g="0" b="0"/>
+        </a:fillRef>
+        <a:effectRef idx="0">
+          <a:scrgbClr r="0" g="0" b="0"/>
+        </a:effectRef>
+        <a:fontRef idx="minor"/>
+      </dsp:style>
+    </dsp:sp>
+    <dsp:sp modelId="{78AE5B93-8DEE-704B-86F8-D2CF2AA0493D}">
+      <dsp:nvSpPr>
+        <dsp:cNvPr id="0" name=""/>
+        <dsp:cNvSpPr/>
+      </dsp:nvSpPr>
+      <dsp:spPr>
+        <a:xfrm>
+          <a:off x="525780" y="3013209"/>
+          <a:ext cx="7360920" cy="974160"/>
+        </a:xfrm>
+        <a:prstGeom prst="roundRect">
+          <a:avLst/>
+        </a:prstGeom>
+        <a:solidFill>
+          <a:schemeClr val="accent1">
+            <a:hueOff val="0"/>
+            <a:satOff val="0"/>
+            <a:lumOff val="0"/>
+            <a:alphaOff val="0"/>
+          </a:schemeClr>
+        </a:solidFill>
+        <a:ln w="12700" cap="flat" cmpd="sng" algn="ctr">
+          <a:solidFill>
+            <a:schemeClr val="lt1">
+              <a:hueOff val="0"/>
+              <a:satOff val="0"/>
+              <a:lumOff val="0"/>
+              <a:alphaOff val="0"/>
+            </a:schemeClr>
+          </a:solidFill>
+          <a:prstDash val="solid"/>
+          <a:miter lim="800000"/>
+        </a:ln>
+        <a:effectLst/>
+      </dsp:spPr>
+      <dsp:style>
+        <a:lnRef idx="2">
+          <a:scrgbClr r="0" g="0" b="0"/>
+        </a:lnRef>
+        <a:fillRef idx="1">
+          <a:scrgbClr r="0" g="0" b="0"/>
+        </a:fillRef>
+        <a:effectRef idx="0">
+          <a:scrgbClr r="0" g="0" b="0"/>
+        </a:effectRef>
+        <a:fontRef idx="minor">
+          <a:schemeClr val="lt1"/>
+        </a:fontRef>
+      </dsp:style>
+      <dsp:txBody>
+        <a:bodyPr spcFirstLastPara="0" vert="horz" wrap="square" lIns="278225" tIns="0" rIns="278225" bIns="0" numCol="1" spcCol="1270" anchor="ctr" anchorCtr="0">
+          <a:noAutofit/>
+        </a:bodyPr>
+        <a:lstStyle/>
+        <a:p>
+          <a:pPr marL="0" lvl="0" indent="0" algn="l" defTabSz="1066800">
+            <a:lnSpc>
+              <a:spcPct val="90000"/>
+            </a:lnSpc>
+            <a:spcBef>
+              <a:spcPct val="0"/>
+            </a:spcBef>
+            <a:spcAft>
+              <a:spcPct val="35000"/>
+            </a:spcAft>
+            <a:buNone/>
+          </a:pPr>
+          <a:r>
+            <a:rPr lang="en-US" altLang="zh-CN" sz="2400" b="0" kern="1200" dirty="0">
+              <a:solidFill>
+                <a:schemeClr val="bg1"/>
+              </a:solidFill>
+            </a:rPr>
+            <a:t>Next step</a:t>
+          </a:r>
+          <a:endParaRPr lang="zh-CN" altLang="en-US" sz="2400" b="0" kern="1200" dirty="0">
+            <a:solidFill>
+              <a:schemeClr val="bg1"/>
+            </a:solidFill>
+          </a:endParaRPr>
+        </a:p>
+      </dsp:txBody>
+      <dsp:txXfrm>
+        <a:off x="573335" y="3060764"/>
+        <a:ext cx="7265810" cy="879050"/>
+      </dsp:txXfrm>
+    </dsp:sp>
+  </dsp:spTree>
+</dsp:drawing>
+</file>
+
+<file path=ppt/diagrams/drawing2.xml><?xml version="1.0" encoding="utf-8"?>
+<dsp:drawing xmlns:dgm="http://schemas.openxmlformats.org/drawingml/2006/diagram" xmlns:dsp="http://schemas.microsoft.com/office/drawing/2008/diagram" xmlns:a="http://schemas.openxmlformats.org/drawingml/2006/main">
+  <dsp:spTree>
+    <dsp:nvGrpSpPr>
+      <dsp:cNvPr id="0" name=""/>
+      <dsp:cNvGrpSpPr/>
+    </dsp:nvGrpSpPr>
+    <dsp:grpSpPr/>
+    <dsp:sp modelId="{AE644DA1-FB96-AD46-9351-A63F15BA70E1}">
+      <dsp:nvSpPr>
+        <dsp:cNvPr id="0" name=""/>
+        <dsp:cNvSpPr/>
+      </dsp:nvSpPr>
+      <dsp:spPr>
+        <a:xfrm>
+          <a:off x="0" y="506529"/>
+          <a:ext cx="10515600" cy="831599"/>
+        </a:xfrm>
+        <a:prstGeom prst="rect">
+          <a:avLst/>
+        </a:prstGeom>
+        <a:solidFill>
+          <a:schemeClr val="lt1">
+            <a:alpha val="90000"/>
+            <a:hueOff val="0"/>
+            <a:satOff val="0"/>
+            <a:lumOff val="0"/>
+            <a:alphaOff val="0"/>
+          </a:schemeClr>
+        </a:solidFill>
+        <a:ln w="12700" cap="flat" cmpd="sng" algn="ctr">
+          <a:solidFill>
+            <a:schemeClr val="accent1">
+              <a:hueOff val="0"/>
+              <a:satOff val="0"/>
+              <a:lumOff val="0"/>
+              <a:alphaOff val="0"/>
+            </a:schemeClr>
+          </a:solidFill>
+          <a:prstDash val="solid"/>
+          <a:miter lim="800000"/>
+        </a:ln>
+        <a:effectLst/>
+      </dsp:spPr>
+      <dsp:style>
+        <a:lnRef idx="2">
+          <a:scrgbClr r="0" g="0" b="0"/>
+        </a:lnRef>
+        <a:fillRef idx="1">
+          <a:scrgbClr r="0" g="0" b="0"/>
+        </a:fillRef>
+        <a:effectRef idx="0">
+          <a:scrgbClr r="0" g="0" b="0"/>
+        </a:effectRef>
+        <a:fontRef idx="minor"/>
+      </dsp:style>
+    </dsp:sp>
+    <dsp:sp modelId="{4DE260E5-B794-E44D-9A9E-F4D646D8E5A7}">
+      <dsp:nvSpPr>
+        <dsp:cNvPr id="0" name=""/>
+        <dsp:cNvSpPr/>
+      </dsp:nvSpPr>
+      <dsp:spPr>
+        <a:xfrm>
+          <a:off x="525780" y="19449"/>
+          <a:ext cx="8050859" cy="974160"/>
+        </a:xfrm>
+        <a:prstGeom prst="roundRect">
+          <a:avLst/>
+        </a:prstGeom>
+        <a:solidFill>
+          <a:schemeClr val="accent1">
+            <a:hueOff val="0"/>
+            <a:satOff val="0"/>
+            <a:lumOff val="0"/>
+            <a:alphaOff val="0"/>
+          </a:schemeClr>
+        </a:solidFill>
+        <a:ln w="12700" cap="flat" cmpd="sng" algn="ctr">
+          <a:solidFill>
+            <a:schemeClr val="lt1">
+              <a:hueOff val="0"/>
+              <a:satOff val="0"/>
+              <a:lumOff val="0"/>
+              <a:alphaOff val="0"/>
+            </a:schemeClr>
+          </a:solidFill>
+          <a:prstDash val="solid"/>
+          <a:miter lim="800000"/>
+        </a:ln>
+        <a:effectLst/>
+      </dsp:spPr>
+      <dsp:style>
+        <a:lnRef idx="2">
+          <a:scrgbClr r="0" g="0" b="0"/>
+        </a:lnRef>
+        <a:fillRef idx="1">
+          <a:scrgbClr r="0" g="0" b="0"/>
+        </a:fillRef>
+        <a:effectRef idx="0">
+          <a:scrgbClr r="0" g="0" b="0"/>
+        </a:effectRef>
+        <a:fontRef idx="minor">
+          <a:schemeClr val="lt1"/>
+        </a:fontRef>
+      </dsp:style>
+      <dsp:txBody>
+        <a:bodyPr spcFirstLastPara="0" vert="horz" wrap="square" lIns="278225" tIns="0" rIns="278225" bIns="0" numCol="1" spcCol="1270" anchor="ctr" anchorCtr="0">
+          <a:noAutofit/>
+        </a:bodyPr>
+        <a:lstStyle/>
+        <a:p>
+          <a:pPr marL="0" lvl="0" indent="0" algn="l" defTabSz="1066800" rtl="0">
+            <a:lnSpc>
+              <a:spcPct val="90000"/>
+            </a:lnSpc>
+            <a:spcBef>
+              <a:spcPct val="0"/>
+            </a:spcBef>
+            <a:spcAft>
+              <a:spcPct val="35000"/>
+            </a:spcAft>
+            <a:buNone/>
+          </a:pPr>
+          <a:r>
+            <a:rPr lang="en-US" sz="2400" b="0" kern="1200" dirty="0">
+              <a:solidFill>
+                <a:schemeClr val="bg1"/>
+              </a:solidFill>
+            </a:rPr>
+            <a:t>Last time</a:t>
+          </a:r>
+        </a:p>
+      </dsp:txBody>
+      <dsp:txXfrm>
+        <a:off x="573335" y="67004"/>
+        <a:ext cx="7955749" cy="879050"/>
       </dsp:txXfrm>
     </dsp:sp>
     <dsp:sp modelId="{5CB3B87C-1EFC-DB45-96D0-47D3B8976425}">
@@ -8749,8 +9094,8 @@
       </dsp:nvSpPr>
       <dsp:spPr>
         <a:xfrm>
-          <a:off x="0" y="3066129"/>
-          <a:ext cx="10515600" cy="1285199"/>
+          <a:off x="0" y="2003409"/>
+          <a:ext cx="10515600" cy="831599"/>
         </a:xfrm>
         <a:prstGeom prst="rect">
           <a:avLst/>
@@ -8798,8 +9143,8 @@
       </dsp:nvSpPr>
       <dsp:spPr>
         <a:xfrm>
-          <a:off x="506604" y="2337065"/>
-          <a:ext cx="8101060" cy="1505520"/>
+          <a:off x="506604" y="1531662"/>
+          <a:ext cx="8101060" cy="974160"/>
         </a:xfrm>
         <a:prstGeom prst="roundRect">
           <a:avLst/>
@@ -8869,8 +9214,144 @@
         </a:p>
       </dsp:txBody>
       <dsp:txXfrm>
-        <a:off x="580097" y="2410558"/>
-        <a:ext cx="7954074" cy="1358534"/>
+        <a:off x="554159" y="1579217"/>
+        <a:ext cx="8005950" cy="879050"/>
+      </dsp:txXfrm>
+    </dsp:sp>
+    <dsp:sp modelId="{5A72D70B-95A3-FE4A-9803-85FD746B2080}">
+      <dsp:nvSpPr>
+        <dsp:cNvPr id="0" name=""/>
+        <dsp:cNvSpPr/>
+      </dsp:nvSpPr>
+      <dsp:spPr>
+        <a:xfrm>
+          <a:off x="0" y="3500289"/>
+          <a:ext cx="10515600" cy="831599"/>
+        </a:xfrm>
+        <a:prstGeom prst="rect">
+          <a:avLst/>
+        </a:prstGeom>
+        <a:solidFill>
+          <a:schemeClr val="lt1">
+            <a:alpha val="90000"/>
+            <a:hueOff val="0"/>
+            <a:satOff val="0"/>
+            <a:lumOff val="0"/>
+            <a:alphaOff val="0"/>
+          </a:schemeClr>
+        </a:solidFill>
+        <a:ln w="12700" cap="flat" cmpd="sng" algn="ctr">
+          <a:solidFill>
+            <a:schemeClr val="accent1">
+              <a:hueOff val="0"/>
+              <a:satOff val="0"/>
+              <a:lumOff val="0"/>
+              <a:alphaOff val="0"/>
+            </a:schemeClr>
+          </a:solidFill>
+          <a:prstDash val="solid"/>
+          <a:miter lim="800000"/>
+        </a:ln>
+        <a:effectLst/>
+      </dsp:spPr>
+      <dsp:style>
+        <a:lnRef idx="2">
+          <a:scrgbClr r="0" g="0" b="0"/>
+        </a:lnRef>
+        <a:fillRef idx="1">
+          <a:scrgbClr r="0" g="0" b="0"/>
+        </a:fillRef>
+        <a:effectRef idx="0">
+          <a:scrgbClr r="0" g="0" b="0"/>
+        </a:effectRef>
+        <a:fontRef idx="minor"/>
+      </dsp:style>
+    </dsp:sp>
+    <dsp:sp modelId="{78AE5B93-8DEE-704B-86F8-D2CF2AA0493D}">
+      <dsp:nvSpPr>
+        <dsp:cNvPr id="0" name=""/>
+        <dsp:cNvSpPr/>
+      </dsp:nvSpPr>
+      <dsp:spPr>
+        <a:xfrm>
+          <a:off x="525780" y="3013209"/>
+          <a:ext cx="7360920" cy="974160"/>
+        </a:xfrm>
+        <a:prstGeom prst="roundRect">
+          <a:avLst/>
+        </a:prstGeom>
+        <a:solidFill>
+          <a:schemeClr val="accent1">
+            <a:hueOff val="0"/>
+            <a:satOff val="0"/>
+            <a:lumOff val="0"/>
+            <a:alphaOff val="0"/>
+          </a:schemeClr>
+        </a:solidFill>
+        <a:ln w="12700" cap="flat" cmpd="sng" algn="ctr">
+          <a:solidFill>
+            <a:schemeClr val="lt1">
+              <a:hueOff val="0"/>
+              <a:satOff val="0"/>
+              <a:lumOff val="0"/>
+              <a:alphaOff val="0"/>
+            </a:schemeClr>
+          </a:solidFill>
+          <a:prstDash val="solid"/>
+          <a:miter lim="800000"/>
+        </a:ln>
+        <a:effectLst/>
+      </dsp:spPr>
+      <dsp:style>
+        <a:lnRef idx="2">
+          <a:scrgbClr r="0" g="0" b="0"/>
+        </a:lnRef>
+        <a:fillRef idx="1">
+          <a:scrgbClr r="0" g="0" b="0"/>
+        </a:fillRef>
+        <a:effectRef idx="0">
+          <a:scrgbClr r="0" g="0" b="0"/>
+        </a:effectRef>
+        <a:fontRef idx="minor">
+          <a:schemeClr val="lt1"/>
+        </a:fontRef>
+      </dsp:style>
+      <dsp:txBody>
+        <a:bodyPr spcFirstLastPara="0" vert="horz" wrap="square" lIns="278225" tIns="0" rIns="278225" bIns="0" numCol="1" spcCol="1270" anchor="ctr" anchorCtr="0">
+          <a:noAutofit/>
+        </a:bodyPr>
+        <a:lstStyle/>
+        <a:p>
+          <a:pPr marL="0" lvl="0" indent="0" algn="l" defTabSz="1066800">
+            <a:lnSpc>
+              <a:spcPct val="90000"/>
+            </a:lnSpc>
+            <a:spcBef>
+              <a:spcPct val="0"/>
+            </a:spcBef>
+            <a:spcAft>
+              <a:spcPct val="35000"/>
+            </a:spcAft>
+            <a:buNone/>
+          </a:pPr>
+          <a:r>
+            <a:rPr lang="en-US" altLang="zh-CN" sz="2400" b="0" kern="1200" dirty="0">
+              <a:solidFill>
+                <a:schemeClr val="bg1"/>
+              </a:solidFill>
+            </a:rPr>
+            <a:t>Next step</a:t>
+          </a:r>
+          <a:endParaRPr lang="zh-CN" altLang="en-US" sz="2400" b="0" kern="1200" dirty="0">
+            <a:solidFill>
+              <a:schemeClr val="bg1"/>
+            </a:solidFill>
+          </a:endParaRPr>
+        </a:p>
+      </dsp:txBody>
+      <dsp:txXfrm>
+        <a:off x="573335" y="3060764"/>
+        <a:ext cx="7265810" cy="879050"/>
       </dsp:txXfrm>
     </dsp:sp>
   </dsp:spTree>
@@ -9002,18 +9483,13 @@
             <a:buNone/>
           </a:pPr>
           <a:r>
-            <a:rPr lang="en-US" sz="2400" b="0" kern="1200">
+            <a:rPr lang="en-US" sz="2400" b="0" kern="1200" dirty="0">
               <a:solidFill>
                 <a:schemeClr val="bg1"/>
               </a:solidFill>
             </a:rPr>
             <a:t>Last time</a:t>
           </a:r>
-          <a:endParaRPr lang="en-US" sz="2400" b="0" kern="1200" dirty="0">
-            <a:solidFill>
-              <a:schemeClr val="bg1"/>
-            </a:solidFill>
-          </a:endParaRPr>
         </a:p>
       </dsp:txBody>
       <dsp:txXfrm>
@@ -14007,7 +14483,7 @@
     </p:spTree>
     <p:extLst>
       <p:ext uri="{BB962C8B-B14F-4D97-AF65-F5344CB8AC3E}">
-        <p14:creationId xmlns:p14="http://schemas.microsoft.com/office/powerpoint/2010/main" val="2325540379"/>
+        <p14:creationId xmlns:p14="http://schemas.microsoft.com/office/powerpoint/2010/main" val="2841332153"/>
       </p:ext>
     </p:extLst>
   </p:cSld>
@@ -14175,7 +14651,7 @@
     </p:spTree>
     <p:extLst>
       <p:ext uri="{BB962C8B-B14F-4D97-AF65-F5344CB8AC3E}">
-        <p14:creationId xmlns:p14="http://schemas.microsoft.com/office/powerpoint/2010/main" val="2383599426"/>
+        <p14:creationId xmlns:p14="http://schemas.microsoft.com/office/powerpoint/2010/main" val="1466349193"/>
       </p:ext>
     </p:extLst>
   </p:cSld>
@@ -21465,6 +21941,49 @@
           </a:ln>
         </p:spPr>
       </p:pic>
+      <p:sp>
+        <p:nvSpPr>
+          <p:cNvPr id="4" name="文本框 3">
+            <a:extLst>
+              <a:ext uri="{FF2B5EF4-FFF2-40B4-BE49-F238E27FC236}">
+                <a16:creationId xmlns:a16="http://schemas.microsoft.com/office/drawing/2014/main" id="{33CD7914-DA8C-F7EC-F67D-63D750C8B09F}"/>
+              </a:ext>
+            </a:extLst>
+          </p:cNvPr>
+          <p:cNvSpPr txBox="1"/>
+          <p:nvPr/>
+        </p:nvSpPr>
+        <p:spPr>
+          <a:xfrm>
+            <a:off x="668182" y="6301368"/>
+            <a:ext cx="9195146" cy="307777"/>
+          </a:xfrm>
+          <a:prstGeom prst="rect">
+            <a:avLst/>
+          </a:prstGeom>
+          <a:noFill/>
+        </p:spPr>
+        <p:txBody>
+          <a:bodyPr wrap="none" rtlCol="0">
+            <a:spAutoFit/>
+          </a:bodyPr>
+          <a:lstStyle/>
+          <a:p>
+            <a:r>
+              <a:rPr kumimoji="1" lang="en-US" altLang="zh-CN" sz="1400" dirty="0"/>
+              <a:t>For GPU energy consumption, concerning the current device that using, </a:t>
+            </a:r>
+            <a:r>
+              <a:rPr kumimoji="1" lang="en-US" altLang="zh-CN" sz="1400" dirty="0" err="1"/>
+              <a:t>codecarbon</a:t>
+            </a:r>
+            <a:r>
+              <a:rPr kumimoji="1" lang="en-US" altLang="zh-CN" sz="1400" dirty="0"/>
+              <a:t> might not be the best choice</a:t>
+            </a:r>
+          </a:p>
+        </p:txBody>
+      </p:sp>
     </p:spTree>
     <p:extLst>
       <p:ext uri="{BB962C8B-B14F-4D97-AF65-F5344CB8AC3E}">
@@ -22110,7 +22629,7 @@
           <p:nvPr>
             <p:extLst>
               <p:ext uri="{D42A27DB-BD31-4B8C-83A1-F6EECF244321}">
-                <p14:modId xmlns:p14="http://schemas.microsoft.com/office/powerpoint/2010/main" val="1073356808"/>
+                <p14:modId xmlns:p14="http://schemas.microsoft.com/office/powerpoint/2010/main" val="523627949"/>
               </p:ext>
             </p:extLst>
           </p:nvPr>
@@ -22125,39 +22644,6 @@
           </a:graphicData>
         </a:graphic>
       </p:graphicFrame>
-      <p:pic>
-        <p:nvPicPr>
-          <p:cNvPr id="2" name="Google Shape;64;p1">
-            <a:extLst>
-              <a:ext uri="{FF2B5EF4-FFF2-40B4-BE49-F238E27FC236}">
-                <a16:creationId xmlns:a16="http://schemas.microsoft.com/office/drawing/2014/main" id="{737FC5B6-5184-D698-21FB-428DF6438BC9}"/>
-              </a:ext>
-            </a:extLst>
-          </p:cNvPr>
-          <p:cNvPicPr preferRelativeResize="0"/>
-          <p:nvPr/>
-        </p:nvPicPr>
-        <p:blipFill rotWithShape="1">
-          <a:blip r:embed="rId8">
-            <a:alphaModFix/>
-          </a:blip>
-          <a:srcRect/>
-          <a:stretch/>
-        </p:blipFill>
-        <p:spPr>
-          <a:xfrm>
-            <a:off x="9863328" y="1"/>
-            <a:ext cx="2328672" cy="1028700"/>
-          </a:xfrm>
-          <a:prstGeom prst="rect">
-            <a:avLst/>
-          </a:prstGeom>
-          <a:noFill/>
-          <a:ln>
-            <a:noFill/>
-          </a:ln>
-        </p:spPr>
-      </p:pic>
       <p:sp>
         <p:nvSpPr>
           <p:cNvPr id="3" name="灯片编号占位符 2">
@@ -22187,10 +22673,43 @@
           </a:p>
         </p:txBody>
       </p:sp>
+      <p:pic>
+        <p:nvPicPr>
+          <p:cNvPr id="4" name="Google Shape;64;p1" descr="徽标&#10;&#10;描述已自动生成">
+            <a:extLst>
+              <a:ext uri="{FF2B5EF4-FFF2-40B4-BE49-F238E27FC236}">
+                <a16:creationId xmlns:a16="http://schemas.microsoft.com/office/drawing/2014/main" id="{E797683B-9D08-0DD4-0D92-B4721913B11E}"/>
+              </a:ext>
+            </a:extLst>
+          </p:cNvPr>
+          <p:cNvPicPr preferRelativeResize="0"/>
+          <p:nvPr/>
+        </p:nvPicPr>
+        <p:blipFill rotWithShape="1">
+          <a:blip r:embed="rId8">
+            <a:alphaModFix/>
+          </a:blip>
+          <a:srcRect/>
+          <a:stretch/>
+        </p:blipFill>
+        <p:spPr>
+          <a:xfrm>
+            <a:off x="9863328" y="1"/>
+            <a:ext cx="2328672" cy="1028700"/>
+          </a:xfrm>
+          <a:prstGeom prst="rect">
+            <a:avLst/>
+          </a:prstGeom>
+          <a:noFill/>
+          <a:ln>
+            <a:noFill/>
+          </a:ln>
+        </p:spPr>
+      </p:pic>
     </p:spTree>
     <p:extLst>
       <p:ext uri="{BB962C8B-B14F-4D97-AF65-F5344CB8AC3E}">
-        <p14:creationId xmlns:p14="http://schemas.microsoft.com/office/powerpoint/2010/main" val="4045649330"/>
+        <p14:creationId xmlns:p14="http://schemas.microsoft.com/office/powerpoint/2010/main" val="3429211201"/>
       </p:ext>
     </p:extLst>
   </p:cSld>
@@ -22793,7 +23312,7 @@
           <p:nvPr>
             <p:extLst>
               <p:ext uri="{D42A27DB-BD31-4B8C-83A1-F6EECF244321}">
-                <p14:modId xmlns:p14="http://schemas.microsoft.com/office/powerpoint/2010/main" val="912654766"/>
+                <p14:modId xmlns:p14="http://schemas.microsoft.com/office/powerpoint/2010/main" val="3694007786"/>
               </p:ext>
             </p:extLst>
           </p:nvPr>
@@ -22808,39 +23327,6 @@
           </a:graphicData>
         </a:graphic>
       </p:graphicFrame>
-      <p:pic>
-        <p:nvPicPr>
-          <p:cNvPr id="2" name="Google Shape;64;p1">
-            <a:extLst>
-              <a:ext uri="{FF2B5EF4-FFF2-40B4-BE49-F238E27FC236}">
-                <a16:creationId xmlns:a16="http://schemas.microsoft.com/office/drawing/2014/main" id="{737FC5B6-5184-D698-21FB-428DF6438BC9}"/>
-              </a:ext>
-            </a:extLst>
-          </p:cNvPr>
-          <p:cNvPicPr preferRelativeResize="0"/>
-          <p:nvPr/>
-        </p:nvPicPr>
-        <p:blipFill rotWithShape="1">
-          <a:blip r:embed="rId8">
-            <a:alphaModFix/>
-          </a:blip>
-          <a:srcRect/>
-          <a:stretch/>
-        </p:blipFill>
-        <p:spPr>
-          <a:xfrm>
-            <a:off x="9863328" y="1"/>
-            <a:ext cx="2328672" cy="1028700"/>
-          </a:xfrm>
-          <a:prstGeom prst="rect">
-            <a:avLst/>
-          </a:prstGeom>
-          <a:noFill/>
-          <a:ln>
-            <a:noFill/>
-          </a:ln>
-        </p:spPr>
-      </p:pic>
       <p:sp>
         <p:nvSpPr>
           <p:cNvPr id="3" name="灯片编号占位符 2">
@@ -22870,10 +23356,43 @@
           </a:p>
         </p:txBody>
       </p:sp>
+      <p:pic>
+        <p:nvPicPr>
+          <p:cNvPr id="4" name="Google Shape;64;p1" descr="徽标&#10;&#10;描述已自动生成">
+            <a:extLst>
+              <a:ext uri="{FF2B5EF4-FFF2-40B4-BE49-F238E27FC236}">
+                <a16:creationId xmlns:a16="http://schemas.microsoft.com/office/drawing/2014/main" id="{E797683B-9D08-0DD4-0D92-B4721913B11E}"/>
+              </a:ext>
+            </a:extLst>
+          </p:cNvPr>
+          <p:cNvPicPr preferRelativeResize="0"/>
+          <p:nvPr/>
+        </p:nvPicPr>
+        <p:blipFill rotWithShape="1">
+          <a:blip r:embed="rId8">
+            <a:alphaModFix/>
+          </a:blip>
+          <a:srcRect/>
+          <a:stretch/>
+        </p:blipFill>
+        <p:spPr>
+          <a:xfrm>
+            <a:off x="9863328" y="1"/>
+            <a:ext cx="2328672" cy="1028700"/>
+          </a:xfrm>
+          <a:prstGeom prst="rect">
+            <a:avLst/>
+          </a:prstGeom>
+          <a:noFill/>
+          <a:ln>
+            <a:noFill/>
+          </a:ln>
+        </p:spPr>
+      </p:pic>
     </p:spTree>
     <p:extLst>
       <p:ext uri="{BB962C8B-B14F-4D97-AF65-F5344CB8AC3E}">
-        <p14:creationId xmlns:p14="http://schemas.microsoft.com/office/powerpoint/2010/main" val="2582942068"/>
+        <p14:creationId xmlns:p14="http://schemas.microsoft.com/office/powerpoint/2010/main" val="152389043"/>
       </p:ext>
     </p:extLst>
   </p:cSld>

</xml_diff>